<commit_message>
Update ABP Comm Talks 2025.10 Intro.pptx
</commit_message>
<xml_diff>
--- a/2025-12-18 ABP Community Talks 2025.10/ABP Comm Talks 2025.10 Intro.pptx
+++ b/2025-12-18 ABP Community Talks 2025.10/ABP Comm Talks 2025.10 Intro.pptx
@@ -4023,7 +4023,7 @@
               <a:buNone/>
             </a:pPr>
             <a:r>
-              <a:rPr lang="tr-TR" sz="3600" b="1">
+              <a:rPr lang="tr-TR" sz="3600" b="1" dirty="0">
                 <a:solidFill>
                   <a:srgbClr val="292D33"/>
                 </a:solidFill>
@@ -4350,7 +4350,7 @@
                 <a:cs typeface="Poppins" pitchFamily="2" charset="0"/>
                 <a:sym typeface="Poppins"/>
               </a:rPr>
-              <a:t>What </a:t>
+              <a:t>AI for </a:t>
             </a:r>
             <a:r>
               <a:rPr lang="tr-TR" sz="2800" b="1" dirty="0">
@@ -4362,7 +4362,7 @@
                 <a:cs typeface="Poppins" pitchFamily="2" charset="0"/>
                 <a:sym typeface="Poppins"/>
               </a:rPr>
-              <a:t>ABP Team </a:t>
+              <a:t>ABP </a:t>
             </a:r>
             <a:r>
               <a:rPr lang="tr-TR" sz="2800" dirty="0">
@@ -4374,7 +4374,7 @@
                 <a:cs typeface="Poppins" pitchFamily="2" charset="0"/>
                 <a:sym typeface="Poppins"/>
               </a:rPr>
-              <a:t>is doing?</a:t>
+              <a:t>Developers</a:t>
             </a:r>
             <a:endParaRPr lang="en-US" sz="2800" dirty="0">
               <a:solidFill>
@@ -8790,7 +8790,31 @@
                 <a:cs typeface="Poppins" panose="00000500000000000000" pitchFamily="2" charset="-94"/>
                 <a:sym typeface="Poppins"/>
               </a:rPr>
-              <a:t>AI Management Module</a:t>
+              <a:t>The </a:t>
+            </a:r>
+            <a:r>
+              <a:rPr lang="tr-TR" sz="2800" b="1" dirty="0">
+                <a:solidFill>
+                  <a:srgbClr val="5C6571"/>
+                </a:solidFill>
+                <a:latin typeface="Poppins" panose="00000500000000000000" pitchFamily="2" charset="-94"/>
+                <a:ea typeface="Poppins"/>
+                <a:cs typeface="Poppins" panose="00000500000000000000" pitchFamily="2" charset="-94"/>
+                <a:sym typeface="Poppins"/>
+              </a:rPr>
+              <a:t>AI Management </a:t>
+            </a:r>
+            <a:r>
+              <a:rPr lang="tr-TR" sz="2800" dirty="0">
+                <a:solidFill>
+                  <a:srgbClr val="5C6571"/>
+                </a:solidFill>
+                <a:latin typeface="Poppins" panose="00000500000000000000" pitchFamily="2" charset="-94"/>
+                <a:ea typeface="Poppins"/>
+                <a:cs typeface="Poppins" panose="00000500000000000000" pitchFamily="2" charset="-94"/>
+                <a:sym typeface="Poppins"/>
+              </a:rPr>
+              <a:t>Module</a:t>
             </a:r>
           </a:p>
           <a:p>

</xml_diff>